<commit_message>
Mise à jour du fichier Diaporama.pptx
</commit_message>
<xml_diff>
--- a/Exercice PS4/Atelier 1/Diaporama.pptx
+++ b/Exercice PS4/Atelier 1/Diaporama.pptx
@@ -143,7 +143,7 @@
       </p:grpSpPr>
       <p:sp>
         <p:nvSpPr>
-          <p:cNvPr id="1998009889" name="Espace réservé d'en-tête 1"/>
+          <p:cNvPr id="447185241" name="Espace réservé d'en-tête 1"/>
           <p:cNvSpPr>
             <a:spLocks noGrp="1"/>
           </p:cNvSpPr>
@@ -177,7 +177,7 @@
       </p:sp>
       <p:sp>
         <p:nvSpPr>
-          <p:cNvPr id="1610230906" name="Espace réservé pour la date 2"/>
+          <p:cNvPr id="1836370444" name="Espace réservé pour la date 2"/>
           <p:cNvSpPr>
             <a:spLocks noGrp="1"/>
           </p:cNvSpPr>
@@ -215,7 +215,7 @@
       </p:sp>
       <p:sp>
         <p:nvSpPr>
-          <p:cNvPr id="1933080045" name="Espace réservé pour l'image de la diapositive 3"/>
+          <p:cNvPr id="829291580" name="Espace réservé pour l'image de la diapositive 3"/>
           <p:cNvSpPr>
             <a:spLocks noChangeAspect="1" noGrp="1" noRot="1"/>
           </p:cNvSpPr>
@@ -251,7 +251,7 @@
       </p:sp>
       <p:sp>
         <p:nvSpPr>
-          <p:cNvPr id="730009121" name="Remarques Espace réservé 4"/>
+          <p:cNvPr id="703918719" name="Remarques Espace réservé 4"/>
           <p:cNvSpPr>
             <a:spLocks noGrp="1"/>
           </p:cNvSpPr>
@@ -325,7 +325,7 @@
       </p:sp>
       <p:sp>
         <p:nvSpPr>
-          <p:cNvPr id="1758350349" name="Espace réservé du pied de page 5"/>
+          <p:cNvPr id="602319253" name="Espace réservé du pied de page 5"/>
           <p:cNvSpPr>
             <a:spLocks noGrp="1"/>
           </p:cNvSpPr>
@@ -359,7 +359,7 @@
       </p:sp>
       <p:sp>
         <p:nvSpPr>
-          <p:cNvPr id="293730835" name="Espace réservé du numéro de diapositive 6"/>
+          <p:cNvPr id="1263065606" name="Espace réservé du numéro de diapositive 6"/>
           <p:cNvSpPr>
             <a:spLocks noGrp="1"/>
           </p:cNvSpPr>
@@ -512,7 +512,7 @@
       </p:grpSpPr>
       <p:sp>
         <p:nvSpPr>
-          <p:cNvPr id="1004483511" name="Espace réservé pour l'image de la diapositive 1"/>
+          <p:cNvPr id="378098973" name="Espace réservé pour l'image de la diapositive 1"/>
           <p:cNvSpPr>
             <a:spLocks noChangeAspect="1" noGrp="1" noRot="1"/>
           </p:cNvSpPr>
@@ -529,7 +529,7 @@
       </p:sp>
       <p:sp>
         <p:nvSpPr>
-          <p:cNvPr id="1389245901" name="Remarques Espace réservé 2"/>
+          <p:cNvPr id="774795436" name="Remarques Espace réservé 2"/>
           <p:cNvSpPr>
             <a:spLocks noGrp="1"/>
           </p:cNvSpPr>
@@ -554,7 +554,7 @@
       </p:sp>
       <p:sp>
         <p:nvSpPr>
-          <p:cNvPr id="1786490867" name="Espace réservé pour le numéro de diapositive 3"/>
+          <p:cNvPr id="1177813683" name="Espace réservé pour le numéro de diapositive 3"/>
           <p:cNvSpPr>
             <a:spLocks noGrp="1"/>
           </p:cNvSpPr>
@@ -690,7 +690,7 @@
       </p:grpSpPr>
       <p:sp>
         <p:nvSpPr>
-          <p:cNvPr id="2023646599" name="Slide Image Placeholder 1"/>
+          <p:cNvPr id="317814784" name="Slide Image Placeholder 1"/>
           <p:cNvSpPr>
             <a:spLocks noChangeAspect="1" noGrp="1" noRot="1"/>
           </p:cNvSpPr>
@@ -702,7 +702,7 @@
       </p:sp>
       <p:sp>
         <p:nvSpPr>
-          <p:cNvPr id="322674966" name="Notes Placeholder 2"/>
+          <p:cNvPr id="1375912054" name="Notes Placeholder 2"/>
           <p:cNvSpPr>
             <a:spLocks noGrp="1"/>
           </p:cNvSpPr>
@@ -724,7 +724,7 @@
       </p:sp>
       <p:sp>
         <p:nvSpPr>
-          <p:cNvPr id="672219863" name="Slide Number Placeholder 3"/>
+          <p:cNvPr id="645071213" name="Slide Number Placeholder 3"/>
           <p:cNvSpPr>
             <a:spLocks noGrp="1"/>
           </p:cNvSpPr>
@@ -775,7 +775,7 @@
       </p:grpSpPr>
       <p:sp>
         <p:nvSpPr>
-          <p:cNvPr id="2113355096" name="Slide Image Placeholder 1"/>
+          <p:cNvPr id="1491792375" name="Slide Image Placeholder 1"/>
           <p:cNvSpPr>
             <a:spLocks noChangeAspect="1" noGrp="1" noRot="1"/>
           </p:cNvSpPr>
@@ -787,7 +787,7 @@
       </p:sp>
       <p:sp>
         <p:nvSpPr>
-          <p:cNvPr id="2009678253" name="Notes Placeholder 2"/>
+          <p:cNvPr id="562489792" name="Notes Placeholder 2"/>
           <p:cNvSpPr>
             <a:spLocks noGrp="1"/>
           </p:cNvSpPr>
@@ -809,7 +809,7 @@
       </p:sp>
       <p:sp>
         <p:nvSpPr>
-          <p:cNvPr id="442294394" name="Slide Number Placeholder 3"/>
+          <p:cNvPr id="1039578456" name="Slide Number Placeholder 3"/>
           <p:cNvSpPr>
             <a:spLocks noGrp="1"/>
           </p:cNvSpPr>
@@ -860,7 +860,7 @@
       </p:grpSpPr>
       <p:sp>
         <p:nvSpPr>
-          <p:cNvPr id="971225631" name="Slide Image Placeholder 1"/>
+          <p:cNvPr id="1394163410" name="Slide Image Placeholder 1"/>
           <p:cNvSpPr>
             <a:spLocks noChangeAspect="1" noGrp="1" noRot="1"/>
           </p:cNvSpPr>
@@ -872,7 +872,7 @@
       </p:sp>
       <p:sp>
         <p:nvSpPr>
-          <p:cNvPr id="672740317" name="Notes Placeholder 2"/>
+          <p:cNvPr id="1466140096" name="Notes Placeholder 2"/>
           <p:cNvSpPr>
             <a:spLocks noGrp="1"/>
           </p:cNvSpPr>
@@ -894,7 +894,7 @@
       </p:sp>
       <p:sp>
         <p:nvSpPr>
-          <p:cNvPr id="437708739" name="Slide Number Placeholder 3"/>
+          <p:cNvPr id="943208493" name="Slide Number Placeholder 3"/>
           <p:cNvSpPr>
             <a:spLocks noGrp="1"/>
           </p:cNvSpPr>
@@ -945,7 +945,7 @@
       </p:grpSpPr>
       <p:sp>
         <p:nvSpPr>
-          <p:cNvPr id="421045864" name="Slide Image Placeholder 1"/>
+          <p:cNvPr id="1307198858" name="Slide Image Placeholder 1"/>
           <p:cNvSpPr>
             <a:spLocks noChangeAspect="1" noGrp="1" noRot="1"/>
           </p:cNvSpPr>
@@ -957,7 +957,7 @@
       </p:sp>
       <p:sp>
         <p:nvSpPr>
-          <p:cNvPr id="1379770407" name="Notes Placeholder 2"/>
+          <p:cNvPr id="464288220" name="Notes Placeholder 2"/>
           <p:cNvSpPr>
             <a:spLocks noGrp="1"/>
           </p:cNvSpPr>
@@ -979,7 +979,7 @@
       </p:sp>
       <p:sp>
         <p:nvSpPr>
-          <p:cNvPr id="1329860597" name="Slide Number Placeholder 3"/>
+          <p:cNvPr id="1571088362" name="Slide Number Placeholder 3"/>
           <p:cNvSpPr>
             <a:spLocks noGrp="1"/>
           </p:cNvSpPr>
@@ -1030,7 +1030,7 @@
       </p:grpSpPr>
       <p:sp>
         <p:nvSpPr>
-          <p:cNvPr id="558034739" name="Slide Image Placeholder 1"/>
+          <p:cNvPr id="1171235395" name="Slide Image Placeholder 1"/>
           <p:cNvSpPr>
             <a:spLocks noChangeAspect="1" noGrp="1" noRot="1"/>
           </p:cNvSpPr>
@@ -1042,7 +1042,7 @@
       </p:sp>
       <p:sp>
         <p:nvSpPr>
-          <p:cNvPr id="781411850" name="Notes Placeholder 2"/>
+          <p:cNvPr id="1769651066" name="Notes Placeholder 2"/>
           <p:cNvSpPr>
             <a:spLocks noGrp="1"/>
           </p:cNvSpPr>
@@ -1064,7 +1064,7 @@
       </p:sp>
       <p:sp>
         <p:nvSpPr>
-          <p:cNvPr id="677340467" name="Slide Number Placeholder 3"/>
+          <p:cNvPr id="1122665509" name="Slide Number Placeholder 3"/>
           <p:cNvSpPr>
             <a:spLocks noGrp="1"/>
           </p:cNvSpPr>
@@ -1115,7 +1115,7 @@
       </p:grpSpPr>
       <p:sp>
         <p:nvSpPr>
-          <p:cNvPr id="120327247" name="Slide Image Placeholder 1"/>
+          <p:cNvPr id="1310229788" name="Slide Image Placeholder 1"/>
           <p:cNvSpPr>
             <a:spLocks noChangeAspect="1" noGrp="1" noRot="1"/>
           </p:cNvSpPr>
@@ -1127,7 +1127,7 @@
       </p:sp>
       <p:sp>
         <p:nvSpPr>
-          <p:cNvPr id="1205391672" name="Notes Placeholder 2"/>
+          <p:cNvPr id="1600919304" name="Notes Placeholder 2"/>
           <p:cNvSpPr>
             <a:spLocks noGrp="1"/>
           </p:cNvSpPr>
@@ -1149,7 +1149,7 @@
       </p:sp>
       <p:sp>
         <p:nvSpPr>
-          <p:cNvPr id="2048224370" name="Slide Number Placeholder 3"/>
+          <p:cNvPr id="1997389193" name="Slide Number Placeholder 3"/>
           <p:cNvSpPr>
             <a:spLocks noGrp="1"/>
           </p:cNvSpPr>
@@ -1200,7 +1200,7 @@
       </p:grpSpPr>
       <p:sp>
         <p:nvSpPr>
-          <p:cNvPr id="1702918219" name="Slide Image Placeholder 1"/>
+          <p:cNvPr id="334431381" name="Slide Image Placeholder 1"/>
           <p:cNvSpPr>
             <a:spLocks noChangeAspect="1" noGrp="1" noRot="1"/>
           </p:cNvSpPr>
@@ -1212,7 +1212,7 @@
       </p:sp>
       <p:sp>
         <p:nvSpPr>
-          <p:cNvPr id="1317494345" name="Notes Placeholder 2"/>
+          <p:cNvPr id="1591650525" name="Notes Placeholder 2"/>
           <p:cNvSpPr>
             <a:spLocks noGrp="1"/>
           </p:cNvSpPr>
@@ -1234,7 +1234,7 @@
       </p:sp>
       <p:sp>
         <p:nvSpPr>
-          <p:cNvPr id="220649955" name="Slide Number Placeholder 3"/>
+          <p:cNvPr id="523751367" name="Slide Number Placeholder 3"/>
           <p:cNvSpPr>
             <a:spLocks noGrp="1"/>
           </p:cNvSpPr>
@@ -1370,7 +1370,7 @@
       </p:grpSpPr>
       <p:sp>
         <p:nvSpPr>
-          <p:cNvPr id="831184789" name="Titre 1"/>
+          <p:cNvPr id="87574195" name="Titre 1"/>
           <p:cNvSpPr>
             <a:spLocks noGrp="1"/>
           </p:cNvSpPr>
@@ -1405,7 +1405,7 @@
       </p:sp>
       <p:sp>
         <p:nvSpPr>
-          <p:cNvPr id="1149177284" name="Sous-titre 2"/>
+          <p:cNvPr id="1414097883" name="Sous-titre 2"/>
           <p:cNvSpPr>
             <a:spLocks noGrp="1"/>
           </p:cNvSpPr>
@@ -1473,7 +1473,7 @@
       </p:sp>
       <p:sp>
         <p:nvSpPr>
-          <p:cNvPr id="1411020211" name="Espace réservé de la date 3"/>
+          <p:cNvPr id="1220971786" name="Espace réservé de la date 3"/>
           <p:cNvSpPr>
             <a:spLocks noGrp="1"/>
           </p:cNvSpPr>
@@ -1499,7 +1499,7 @@
       </p:sp>
       <p:sp>
         <p:nvSpPr>
-          <p:cNvPr id="1213552828" name="Espace réservé du pied de page 4"/>
+          <p:cNvPr id="1109978563" name="Espace réservé du pied de page 4"/>
           <p:cNvSpPr>
             <a:spLocks noGrp="1"/>
           </p:cNvSpPr>
@@ -1521,7 +1521,7 @@
       </p:sp>
       <p:sp>
         <p:nvSpPr>
-          <p:cNvPr id="1290055765" name="Espace réservé du numéro de diapositive 5"/>
+          <p:cNvPr id="297513323" name="Espace réservé du numéro de diapositive 5"/>
           <p:cNvSpPr>
             <a:spLocks noGrp="1"/>
           </p:cNvSpPr>
@@ -1572,7 +1572,7 @@
       </p:grpSpPr>
       <p:sp>
         <p:nvSpPr>
-          <p:cNvPr id="1396754729" name="Titre 1"/>
+          <p:cNvPr id="556464616" name="Titre 1"/>
           <p:cNvSpPr>
             <a:spLocks noGrp="1"/>
           </p:cNvSpPr>
@@ -1598,7 +1598,7 @@
       </p:sp>
       <p:sp>
         <p:nvSpPr>
-          <p:cNvPr id="2027619568" name="Espace réservé du texte vertical 2"/>
+          <p:cNvPr id="919621113" name="Espace réservé du texte vertical 2"/>
           <p:cNvSpPr>
             <a:spLocks noGrp="1"/>
           </p:cNvSpPr>
@@ -1664,7 +1664,7 @@
       </p:sp>
       <p:sp>
         <p:nvSpPr>
-          <p:cNvPr id="335411656" name="Espace réservé de la date 3"/>
+          <p:cNvPr id="1598142240" name="Espace réservé de la date 3"/>
           <p:cNvSpPr>
             <a:spLocks noGrp="1"/>
           </p:cNvSpPr>
@@ -1690,7 +1690,7 @@
       </p:sp>
       <p:sp>
         <p:nvSpPr>
-          <p:cNvPr id="1078473825" name="Espace réservé du pied de page 4"/>
+          <p:cNvPr id="604160032" name="Espace réservé du pied de page 4"/>
           <p:cNvSpPr>
             <a:spLocks noGrp="1"/>
           </p:cNvSpPr>
@@ -1712,7 +1712,7 @@
       </p:sp>
       <p:sp>
         <p:nvSpPr>
-          <p:cNvPr id="1857804474" name="Espace réservé du numéro de diapositive 5"/>
+          <p:cNvPr id="14334052" name="Espace réservé du numéro de diapositive 5"/>
           <p:cNvSpPr>
             <a:spLocks noGrp="1"/>
           </p:cNvSpPr>
@@ -1763,7 +1763,7 @@
       </p:grpSpPr>
       <p:sp>
         <p:nvSpPr>
-          <p:cNvPr id="82026051" name="Titre vertical 1"/>
+          <p:cNvPr id="1318399316" name="Titre vertical 1"/>
           <p:cNvSpPr>
             <a:spLocks noGrp="1"/>
           </p:cNvSpPr>
@@ -1794,7 +1794,7 @@
       </p:sp>
       <p:sp>
         <p:nvSpPr>
-          <p:cNvPr id="1463760602" name="Espace réservé du texte vertical 2"/>
+          <p:cNvPr id="1951536120" name="Espace réservé du texte vertical 2"/>
           <p:cNvSpPr>
             <a:spLocks noGrp="1"/>
           </p:cNvSpPr>
@@ -1865,7 +1865,7 @@
       </p:sp>
       <p:sp>
         <p:nvSpPr>
-          <p:cNvPr id="229370820" name="Espace réservé de la date 3"/>
+          <p:cNvPr id="311323409" name="Espace réservé de la date 3"/>
           <p:cNvSpPr>
             <a:spLocks noGrp="1"/>
           </p:cNvSpPr>
@@ -1891,7 +1891,7 @@
       </p:sp>
       <p:sp>
         <p:nvSpPr>
-          <p:cNvPr id="1883055047" name="Espace réservé du pied de page 4"/>
+          <p:cNvPr id="256428378" name="Espace réservé du pied de page 4"/>
           <p:cNvSpPr>
             <a:spLocks noGrp="1"/>
           </p:cNvSpPr>
@@ -1913,7 +1913,7 @@
       </p:sp>
       <p:sp>
         <p:nvSpPr>
-          <p:cNvPr id="393395464" name="Espace réservé du numéro de diapositive 5"/>
+          <p:cNvPr id="1502210092" name="Espace réservé du numéro de diapositive 5"/>
           <p:cNvSpPr>
             <a:spLocks noGrp="1"/>
           </p:cNvSpPr>
@@ -1964,7 +1964,7 @@
       </p:grpSpPr>
       <p:sp>
         <p:nvSpPr>
-          <p:cNvPr id="1034119191" name="Titre 1"/>
+          <p:cNvPr id="1004493164" name="Titre 1"/>
           <p:cNvSpPr>
             <a:spLocks noGrp="1"/>
           </p:cNvSpPr>
@@ -1990,7 +1990,7 @@
       </p:sp>
       <p:sp>
         <p:nvSpPr>
-          <p:cNvPr id="241202790" name="Espace réservé du contenu 2"/>
+          <p:cNvPr id="502764972" name="Espace réservé du contenu 2"/>
           <p:cNvSpPr>
             <a:spLocks noGrp="1"/>
           </p:cNvSpPr>
@@ -2056,7 +2056,7 @@
       </p:sp>
       <p:sp>
         <p:nvSpPr>
-          <p:cNvPr id="1526235886" name="Espace réservé de la date 3"/>
+          <p:cNvPr id="905171735" name="Espace réservé de la date 3"/>
           <p:cNvSpPr>
             <a:spLocks noGrp="1"/>
           </p:cNvSpPr>
@@ -2082,7 +2082,7 @@
       </p:sp>
       <p:sp>
         <p:nvSpPr>
-          <p:cNvPr id="202948689" name="Espace réservé du pied de page 4"/>
+          <p:cNvPr id="1387252000" name="Espace réservé du pied de page 4"/>
           <p:cNvSpPr>
             <a:spLocks noGrp="1"/>
           </p:cNvSpPr>
@@ -2104,7 +2104,7 @@
       </p:sp>
       <p:sp>
         <p:nvSpPr>
-          <p:cNvPr id="1614197471" name="Espace réservé du numéro de diapositive 5"/>
+          <p:cNvPr id="548713268" name="Espace réservé du numéro de diapositive 5"/>
           <p:cNvSpPr>
             <a:spLocks noGrp="1"/>
           </p:cNvSpPr>
@@ -2155,7 +2155,7 @@
       </p:grpSpPr>
       <p:sp>
         <p:nvSpPr>
-          <p:cNvPr id="545184888" name="Titre 1"/>
+          <p:cNvPr id="1265421814" name="Titre 1"/>
           <p:cNvSpPr>
             <a:spLocks noGrp="1"/>
           </p:cNvSpPr>
@@ -2190,7 +2190,7 @@
       </p:sp>
       <p:sp>
         <p:nvSpPr>
-          <p:cNvPr id="1655985300" name="Espace réservé du texte 2"/>
+          <p:cNvPr id="944802669" name="Espace réservé du texte 2"/>
           <p:cNvSpPr>
             <a:spLocks noGrp="1"/>
           </p:cNvSpPr>
@@ -2312,7 +2312,7 @@
       </p:sp>
       <p:sp>
         <p:nvSpPr>
-          <p:cNvPr id="282913446" name="Espace réservé de la date 3"/>
+          <p:cNvPr id="53058226" name="Espace réservé de la date 3"/>
           <p:cNvSpPr>
             <a:spLocks noGrp="1"/>
           </p:cNvSpPr>
@@ -2338,7 +2338,7 @@
       </p:sp>
       <p:sp>
         <p:nvSpPr>
-          <p:cNvPr id="814017181" name="Espace réservé du pied de page 4"/>
+          <p:cNvPr id="325380095" name="Espace réservé du pied de page 4"/>
           <p:cNvSpPr>
             <a:spLocks noGrp="1"/>
           </p:cNvSpPr>
@@ -2360,7 +2360,7 @@
       </p:sp>
       <p:sp>
         <p:nvSpPr>
-          <p:cNvPr id="1284105197" name="Espace réservé du numéro de diapositive 5"/>
+          <p:cNvPr id="788645028" name="Espace réservé du numéro de diapositive 5"/>
           <p:cNvSpPr>
             <a:spLocks noGrp="1"/>
           </p:cNvSpPr>
@@ -2411,7 +2411,7 @@
       </p:grpSpPr>
       <p:sp>
         <p:nvSpPr>
-          <p:cNvPr id="1381291071" name="Titre 1"/>
+          <p:cNvPr id="1464326548" name="Titre 1"/>
           <p:cNvSpPr>
             <a:spLocks noGrp="1"/>
           </p:cNvSpPr>
@@ -2437,7 +2437,7 @@
       </p:sp>
       <p:sp>
         <p:nvSpPr>
-          <p:cNvPr id="844780565" name="Espace réservé du contenu 2"/>
+          <p:cNvPr id="1199367603" name="Espace réservé du contenu 2"/>
           <p:cNvSpPr>
             <a:spLocks noGrp="1"/>
           </p:cNvSpPr>
@@ -2508,7 +2508,7 @@
       </p:sp>
       <p:sp>
         <p:nvSpPr>
-          <p:cNvPr id="1973581264" name="Espace réservé du contenu 3"/>
+          <p:cNvPr id="1383221313" name="Espace réservé du contenu 3"/>
           <p:cNvSpPr>
             <a:spLocks noGrp="1"/>
           </p:cNvSpPr>
@@ -2579,7 +2579,7 @@
       </p:sp>
       <p:sp>
         <p:nvSpPr>
-          <p:cNvPr id="431492773" name="Espace réservé de la date 4"/>
+          <p:cNvPr id="911469673" name="Espace réservé de la date 4"/>
           <p:cNvSpPr>
             <a:spLocks noGrp="1"/>
           </p:cNvSpPr>
@@ -2605,7 +2605,7 @@
       </p:sp>
       <p:sp>
         <p:nvSpPr>
-          <p:cNvPr id="422753012" name="Espace réservé du pied de page 5"/>
+          <p:cNvPr id="684000803" name="Espace réservé du pied de page 5"/>
           <p:cNvSpPr>
             <a:spLocks noGrp="1"/>
           </p:cNvSpPr>
@@ -2627,7 +2627,7 @@
       </p:sp>
       <p:sp>
         <p:nvSpPr>
-          <p:cNvPr id="1332125566" name="Espace réservé du numéro de diapositive 6"/>
+          <p:cNvPr id="756055518" name="Espace réservé du numéro de diapositive 6"/>
           <p:cNvSpPr>
             <a:spLocks noGrp="1"/>
           </p:cNvSpPr>
@@ -2678,7 +2678,7 @@
       </p:grpSpPr>
       <p:sp>
         <p:nvSpPr>
-          <p:cNvPr id="1152853695" name="Titre 1"/>
+          <p:cNvPr id="337803001" name="Titre 1"/>
           <p:cNvSpPr>
             <a:spLocks noGrp="1"/>
           </p:cNvSpPr>
@@ -2709,7 +2709,7 @@
       </p:sp>
       <p:sp>
         <p:nvSpPr>
-          <p:cNvPr id="180288649" name="Espace réservé du texte 2"/>
+          <p:cNvPr id="772444696" name="Espace réservé du texte 2"/>
           <p:cNvSpPr>
             <a:spLocks noGrp="1"/>
           </p:cNvSpPr>
@@ -2777,7 +2777,7 @@
       </p:sp>
       <p:sp>
         <p:nvSpPr>
-          <p:cNvPr id="727203814" name="Espace réservé du contenu 3"/>
+          <p:cNvPr id="1447692" name="Espace réservé du contenu 3"/>
           <p:cNvSpPr>
             <a:spLocks noGrp="1"/>
           </p:cNvSpPr>
@@ -2848,7 +2848,7 @@
       </p:sp>
       <p:sp>
         <p:nvSpPr>
-          <p:cNvPr id="19395242" name="Espace réservé du texte 4"/>
+          <p:cNvPr id="678210012" name="Espace réservé du texte 4"/>
           <p:cNvSpPr>
             <a:spLocks noGrp="1"/>
           </p:cNvSpPr>
@@ -2916,7 +2916,7 @@
       </p:sp>
       <p:sp>
         <p:nvSpPr>
-          <p:cNvPr id="916680678" name="Espace réservé du contenu 5"/>
+          <p:cNvPr id="1738850240" name="Espace réservé du contenu 5"/>
           <p:cNvSpPr>
             <a:spLocks noGrp="1"/>
           </p:cNvSpPr>
@@ -2987,7 +2987,7 @@
       </p:sp>
       <p:sp>
         <p:nvSpPr>
-          <p:cNvPr id="2097907282" name="Espace réservé de la date 6"/>
+          <p:cNvPr id="1880927218" name="Espace réservé de la date 6"/>
           <p:cNvSpPr>
             <a:spLocks noGrp="1"/>
           </p:cNvSpPr>
@@ -3013,7 +3013,7 @@
       </p:sp>
       <p:sp>
         <p:nvSpPr>
-          <p:cNvPr id="2062845588" name="Espace réservé du pied de page 7"/>
+          <p:cNvPr id="291139129" name="Espace réservé du pied de page 7"/>
           <p:cNvSpPr>
             <a:spLocks noGrp="1"/>
           </p:cNvSpPr>
@@ -3035,7 +3035,7 @@
       </p:sp>
       <p:sp>
         <p:nvSpPr>
-          <p:cNvPr id="532618978" name="Espace réservé du numéro de diapositive 8"/>
+          <p:cNvPr id="1928177314" name="Espace réservé du numéro de diapositive 8"/>
           <p:cNvSpPr>
             <a:spLocks noGrp="1"/>
           </p:cNvSpPr>
@@ -3086,7 +3086,7 @@
       </p:grpSpPr>
       <p:sp>
         <p:nvSpPr>
-          <p:cNvPr id="1567997486" name="Titre 1"/>
+          <p:cNvPr id="806738149" name="Titre 1"/>
           <p:cNvSpPr>
             <a:spLocks noGrp="1"/>
           </p:cNvSpPr>
@@ -3112,7 +3112,7 @@
       </p:sp>
       <p:sp>
         <p:nvSpPr>
-          <p:cNvPr id="1820893000" name="Espace réservé de la date 2"/>
+          <p:cNvPr id="214964416" name="Espace réservé de la date 2"/>
           <p:cNvSpPr>
             <a:spLocks noGrp="1"/>
           </p:cNvSpPr>
@@ -3138,7 +3138,7 @@
       </p:sp>
       <p:sp>
         <p:nvSpPr>
-          <p:cNvPr id="457937962" name="Espace réservé du pied de page 3"/>
+          <p:cNvPr id="1804576207" name="Espace réservé du pied de page 3"/>
           <p:cNvSpPr>
             <a:spLocks noGrp="1"/>
           </p:cNvSpPr>
@@ -3160,7 +3160,7 @@
       </p:sp>
       <p:sp>
         <p:nvSpPr>
-          <p:cNvPr id="433837185" name="Espace réservé du numéro de diapositive 4"/>
+          <p:cNvPr id="2098216069" name="Espace réservé du numéro de diapositive 4"/>
           <p:cNvSpPr>
             <a:spLocks noGrp="1"/>
           </p:cNvSpPr>
@@ -3211,7 +3211,7 @@
       </p:grpSpPr>
       <p:sp>
         <p:nvSpPr>
-          <p:cNvPr id="89561810" name="Espace réservé de la date 1"/>
+          <p:cNvPr id="1496134692" name="Espace réservé de la date 1"/>
           <p:cNvSpPr>
             <a:spLocks noGrp="1"/>
           </p:cNvSpPr>
@@ -3237,7 +3237,7 @@
       </p:sp>
       <p:sp>
         <p:nvSpPr>
-          <p:cNvPr id="1721530008" name="Espace réservé du pied de page 2"/>
+          <p:cNvPr id="1227849609" name="Espace réservé du pied de page 2"/>
           <p:cNvSpPr>
             <a:spLocks noGrp="1"/>
           </p:cNvSpPr>
@@ -3259,7 +3259,7 @@
       </p:sp>
       <p:sp>
         <p:nvSpPr>
-          <p:cNvPr id="654724027" name="Espace réservé du numéro de diapositive 3"/>
+          <p:cNvPr id="1228449487" name="Espace réservé du numéro de diapositive 3"/>
           <p:cNvSpPr>
             <a:spLocks noGrp="1"/>
           </p:cNvSpPr>
@@ -3310,7 +3310,7 @@
       </p:grpSpPr>
       <p:sp>
         <p:nvSpPr>
-          <p:cNvPr id="1492895324" name="Titre 1"/>
+          <p:cNvPr id="1368625429" name="Titre 1"/>
           <p:cNvSpPr>
             <a:spLocks noGrp="1"/>
           </p:cNvSpPr>
@@ -3345,7 +3345,7 @@
       </p:sp>
       <p:sp>
         <p:nvSpPr>
-          <p:cNvPr id="123918025" name="Espace réservé du contenu 2"/>
+          <p:cNvPr id="1966457866" name="Espace réservé du contenu 2"/>
           <p:cNvSpPr>
             <a:spLocks noGrp="1"/>
           </p:cNvSpPr>
@@ -3444,7 +3444,7 @@
       </p:sp>
       <p:sp>
         <p:nvSpPr>
-          <p:cNvPr id="1717344001" name="Espace réservé du texte 3"/>
+          <p:cNvPr id="341189000" name="Espace réservé du texte 3"/>
           <p:cNvSpPr>
             <a:spLocks noGrp="1"/>
           </p:cNvSpPr>
@@ -3512,7 +3512,7 @@
       </p:sp>
       <p:sp>
         <p:nvSpPr>
-          <p:cNvPr id="2049897476" name="Espace réservé de la date 4"/>
+          <p:cNvPr id="284490557" name="Espace réservé de la date 4"/>
           <p:cNvSpPr>
             <a:spLocks noGrp="1"/>
           </p:cNvSpPr>
@@ -3538,7 +3538,7 @@
       </p:sp>
       <p:sp>
         <p:nvSpPr>
-          <p:cNvPr id="2012984594" name="Espace réservé du pied de page 5"/>
+          <p:cNvPr id="921408362" name="Espace réservé du pied de page 5"/>
           <p:cNvSpPr>
             <a:spLocks noGrp="1"/>
           </p:cNvSpPr>
@@ -3560,7 +3560,7 @@
       </p:sp>
       <p:sp>
         <p:nvSpPr>
-          <p:cNvPr id="1956579350" name="Espace réservé du numéro de diapositive 6"/>
+          <p:cNvPr id="1391978629" name="Espace réservé du numéro de diapositive 6"/>
           <p:cNvSpPr>
             <a:spLocks noGrp="1"/>
           </p:cNvSpPr>
@@ -3611,7 +3611,7 @@
       </p:grpSpPr>
       <p:sp>
         <p:nvSpPr>
-          <p:cNvPr id="583418366" name="Titre 1"/>
+          <p:cNvPr id="855023107" name="Titre 1"/>
           <p:cNvSpPr>
             <a:spLocks noGrp="1"/>
           </p:cNvSpPr>
@@ -3646,7 +3646,7 @@
       </p:sp>
       <p:sp>
         <p:nvSpPr>
-          <p:cNvPr id="774527472" name="Espace réservé pour une image 2"/>
+          <p:cNvPr id="1606050920" name="Espace réservé pour une image 2"/>
           <p:cNvSpPr>
             <a:spLocks noChangeAspect="1" noGrp="1"/>
           </p:cNvSpPr>
@@ -3714,7 +3714,7 @@
       </p:sp>
       <p:sp>
         <p:nvSpPr>
-          <p:cNvPr id="685378778" name="Espace réservé du texte 3"/>
+          <p:cNvPr id="1447058939" name="Espace réservé du texte 3"/>
           <p:cNvSpPr>
             <a:spLocks noGrp="1"/>
           </p:cNvSpPr>
@@ -3782,7 +3782,7 @@
       </p:sp>
       <p:sp>
         <p:nvSpPr>
-          <p:cNvPr id="711453104" name="Espace réservé de la date 4"/>
+          <p:cNvPr id="250628735" name="Espace réservé de la date 4"/>
           <p:cNvSpPr>
             <a:spLocks noGrp="1"/>
           </p:cNvSpPr>
@@ -3808,7 +3808,7 @@
       </p:sp>
       <p:sp>
         <p:nvSpPr>
-          <p:cNvPr id="1875058390" name="Espace réservé du pied de page 5"/>
+          <p:cNvPr id="548213587" name="Espace réservé du pied de page 5"/>
           <p:cNvSpPr>
             <a:spLocks noGrp="1"/>
           </p:cNvSpPr>
@@ -3830,7 +3830,7 @@
       </p:sp>
       <p:sp>
         <p:nvSpPr>
-          <p:cNvPr id="1492547986" name="Espace réservé du numéro de diapositive 6"/>
+          <p:cNvPr id="1680416337" name="Espace réservé du numéro de diapositive 6"/>
           <p:cNvSpPr>
             <a:spLocks noGrp="1"/>
           </p:cNvSpPr>
@@ -3886,7 +3886,7 @@
       </p:grpSpPr>
       <p:sp>
         <p:nvSpPr>
-          <p:cNvPr id="1958398089" name="Espace réservé du titre 1"/>
+          <p:cNvPr id="828982108" name="Espace réservé du titre 1"/>
           <p:cNvSpPr>
             <a:spLocks noGrp="1"/>
           </p:cNvSpPr>
@@ -3922,7 +3922,7 @@
       </p:sp>
       <p:sp>
         <p:nvSpPr>
-          <p:cNvPr id="1718196273" name="Espace réservé du texte 2"/>
+          <p:cNvPr id="1251386342" name="Espace réservé du texte 2"/>
           <p:cNvSpPr>
             <a:spLocks noGrp="1"/>
           </p:cNvSpPr>
@@ -3998,7 +3998,7 @@
       </p:sp>
       <p:sp>
         <p:nvSpPr>
-          <p:cNvPr id="1058197734" name="Espace réservé de la date 3"/>
+          <p:cNvPr id="2067324364" name="Espace réservé de la date 3"/>
           <p:cNvSpPr>
             <a:spLocks noGrp="1"/>
           </p:cNvSpPr>
@@ -4042,7 +4042,7 @@
       </p:sp>
       <p:sp>
         <p:nvSpPr>
-          <p:cNvPr id="1977116443" name="Espace réservé du pied de page 4"/>
+          <p:cNvPr id="258262682" name="Espace réservé du pied de page 4"/>
           <p:cNvSpPr>
             <a:spLocks noGrp="1"/>
           </p:cNvSpPr>
@@ -4082,7 +4082,7 @@
       </p:sp>
       <p:sp>
         <p:nvSpPr>
-          <p:cNvPr id="326342779" name="Espace réservé du numéro de diapositive 5"/>
+          <p:cNvPr id="1284000055" name="Espace réservé du numéro de diapositive 5"/>
           <p:cNvSpPr>
             <a:spLocks noGrp="1"/>
           </p:cNvSpPr>
@@ -4442,7 +4442,7 @@
       </p:grpSpPr>
       <p:pic>
         <p:nvPicPr>
-          <p:cNvPr id="163143718" name=""/>
+          <p:cNvPr id="1573048014" name=""/>
           <p:cNvPicPr>
             <a:picLocks noChangeAspect="1"/>
           </p:cNvPicPr>
@@ -4465,7 +4465,7 @@
       </p:pic>
       <p:sp>
         <p:nvSpPr>
-          <p:cNvPr id="594181352" name="Titre 1"/>
+          <p:cNvPr id="951010002" name="Titre 1"/>
           <p:cNvSpPr>
             <a:spLocks noGrp="1"/>
           </p:cNvSpPr>
@@ -4958,7 +4958,7 @@
       </p:grpSpPr>
       <p:graphicFrame>
         <p:nvGraphicFramePr>
-          <p:cNvPr id="1582931672" name=""/>
+          <p:cNvPr id="1966426235" name=""/>
           <p:cNvGraphicFramePr>
             <a:graphicFrameLocks xmlns:a="http://schemas.openxmlformats.org/drawingml/2006/main"/>
           </p:cNvGraphicFramePr>
@@ -6156,7 +6156,7 @@
       </p:graphicFrame>
       <p:sp>
         <p:nvSpPr>
-          <p:cNvPr id="918297493" name="Titre 1"/>
+          <p:cNvPr id="101796663" name="Titre 1"/>
           <p:cNvSpPr>
             <a:spLocks noGrp="1"/>
           </p:cNvSpPr>
@@ -6220,7 +6220,7 @@
       </p:grpSpPr>
       <p:graphicFrame>
         <p:nvGraphicFramePr>
-          <p:cNvPr id="130080230" name=""/>
+          <p:cNvPr id="1784482617" name=""/>
           <p:cNvGraphicFramePr>
             <a:graphicFrameLocks xmlns:a="http://schemas.openxmlformats.org/drawingml/2006/main"/>
           </p:cNvGraphicFramePr>
@@ -7443,7 +7443,7 @@
       </p:graphicFrame>
       <p:sp>
         <p:nvSpPr>
-          <p:cNvPr id="829179638" name="Titre 1"/>
+          <p:cNvPr id="302238838" name="Titre 1"/>
           <p:cNvSpPr>
             <a:spLocks noGrp="1"/>
           </p:cNvSpPr>
@@ -7525,7 +7525,7 @@
       </p:grpSpPr>
       <p:graphicFrame>
         <p:nvGraphicFramePr>
-          <p:cNvPr id="1130539769" name=""/>
+          <p:cNvPr id="696478949" name=""/>
           <p:cNvGraphicFramePr>
             <a:graphicFrameLocks xmlns:a="http://schemas.openxmlformats.org/drawingml/2006/main"/>
           </p:cNvGraphicFramePr>
@@ -8165,7 +8165,7 @@
       </p:graphicFrame>
       <p:sp>
         <p:nvSpPr>
-          <p:cNvPr id="1221576536" name="Titre 1"/>
+          <p:cNvPr id="1772294200" name="Titre 1"/>
           <p:cNvSpPr>
             <a:spLocks noGrp="1"/>
           </p:cNvSpPr>
@@ -8196,7 +8196,7 @@
       </p:sp>
       <p:sp>
         <p:nvSpPr>
-          <p:cNvPr id="582570491" name=""/>
+          <p:cNvPr id="794234385" name=""/>
           <p:cNvSpPr/>
           <p:nvPr/>
         </p:nvSpPr>
@@ -8507,7 +8507,7 @@
       </p:grpSpPr>
       <p:sp>
         <p:nvSpPr>
-          <p:cNvPr id="401956153" name="Titre 1"/>
+          <p:cNvPr id="104297482" name="Titre 1"/>
           <p:cNvSpPr>
             <a:spLocks noGrp="1"/>
           </p:cNvSpPr>
@@ -8538,7 +8538,7 @@
       </p:sp>
       <p:graphicFrame>
         <p:nvGraphicFramePr>
-          <p:cNvPr id="460004255" name=""/>
+          <p:cNvPr id="124574838" name=""/>
           <p:cNvGraphicFramePr>
             <a:graphicFrameLocks xmlns:a="http://schemas.openxmlformats.org/drawingml/2006/main"/>
           </p:cNvGraphicFramePr>
@@ -9904,7 +9904,7 @@
       </p:grpSpPr>
       <p:sp>
         <p:nvSpPr>
-          <p:cNvPr id="540901651" name="Titre 1"/>
+          <p:cNvPr id="949573944" name="Titre 1"/>
           <p:cNvSpPr>
             <a:spLocks noGrp="1"/>
           </p:cNvSpPr>
@@ -9935,7 +9935,7 @@
       </p:sp>
       <p:graphicFrame>
         <p:nvGraphicFramePr>
-          <p:cNvPr id="1666065481" name=""/>
+          <p:cNvPr id="1348086197" name=""/>
           <p:cNvGraphicFramePr>
             <a:graphicFrameLocks xmlns:a="http://schemas.openxmlformats.org/drawingml/2006/main"/>
           </p:cNvGraphicFramePr>
@@ -9952,12 +9952,11 @@
                 <a:tableStyleId>{5940675A-B579-460E-94D1-54222C63F5DA}</a:tableStyleId>
               </a:tblPr>
               <a:tblGrid>
-                <a:gridCol w="855782"/>
-                <a:gridCol w="1828722"/>
-                <a:gridCol w="1889096"/>
-                <a:gridCol w="3380488"/>
-                <a:gridCol w="1093687"/>
-                <a:gridCol w="1988522"/>
+                <a:gridCol w="855781"/>
+                <a:gridCol w="1828721"/>
+                <a:gridCol w="1889095"/>
+                <a:gridCol w="3380487"/>
+                <a:gridCol w="1093686"/>
               </a:tblGrid>
               <a:tr h="384810">
                 <a:tc>
@@ -10081,32 +10080,6 @@
                           <a:cs typeface="Arial"/>
                         </a:rPr>
                         <a:t>Probabilité</a:t>
-                      </a:r>
-                      <a:endParaRPr>
-                        <a:latin typeface="Arial"/>
-                        <a:cs typeface="Arial"/>
-                      </a:endParaRPr>
-                    </a:p>
-                  </a:txBody>
-                  <a:tcPr anchor="ctr"/>
-                </a:tc>
-                <a:tc>
-                  <a:txBody>
-                    <a:bodyPr/>
-                    <a:p>
-                      <a:pPr algn="ctr">
-                        <a:defRPr/>
-                      </a:pPr>
-                      <a:r>
-                        <a:rPr sz="1200" b="1" i="0" u="none">
-                          <a:solidFill>
-                            <a:srgbClr val="000000"/>
-                          </a:solidFill>
-                          <a:latin typeface="Arial"/>
-                          <a:ea typeface="Arial"/>
-                          <a:cs typeface="Arial"/>
-                        </a:rPr>
-                        <a:t>Justification (à l’oral ou en note)</a:t>
                       </a:r>
                       <a:endParaRPr>
                         <a:latin typeface="Arial"/>
@@ -10275,32 +10248,6 @@
                     </a:solidFill>
                   </a:tcPr>
                 </a:tc>
-                <a:tc>
-                  <a:txBody>
-                    <a:bodyPr/>
-                    <a:p>
-                      <a:pPr>
-                        <a:defRPr/>
-                      </a:pPr>
-                      <a:r>
-                        <a:rPr sz="1200" b="0" i="0" u="none">
-                          <a:solidFill>
-                            <a:srgbClr val="000000"/>
-                          </a:solidFill>
-                          <a:latin typeface="Arial"/>
-                          <a:ea typeface="Arial"/>
-                          <a:cs typeface="Arial"/>
-                        </a:rPr>
-                        <a:t>Motivation +++ ; Activité ++ ; Pertinence élevée → probabilité forte</a:t>
-                      </a:r>
-                      <a:endParaRPr>
-                        <a:latin typeface="Arial"/>
-                        <a:cs typeface="Arial"/>
-                      </a:endParaRPr>
-                    </a:p>
-                  </a:txBody>
-                  <a:tcPr anchor="ctr"/>
-                </a:tc>
               </a:tr>
               <a:tr h="384810">
                 <a:tc>
@@ -10460,32 +10407,6 @@
                     </a:solidFill>
                   </a:tcPr>
                 </a:tc>
-                <a:tc>
-                  <a:txBody>
-                    <a:bodyPr/>
-                    <a:p>
-                      <a:pPr>
-                        <a:defRPr/>
-                      </a:pPr>
-                      <a:r>
-                        <a:rPr sz="1200" b="0" i="0" u="none">
-                          <a:solidFill>
-                            <a:srgbClr val="000000"/>
-                          </a:solidFill>
-                          <a:latin typeface="Arial"/>
-                          <a:ea typeface="Arial"/>
-                          <a:cs typeface="Arial"/>
-                        </a:rPr>
-                        <a:t>Motivation ++ ; Ressources + ; Activité +++ → probabilité moyenne à forte</a:t>
-                      </a:r>
-                      <a:endParaRPr>
-                        <a:latin typeface="Arial"/>
-                        <a:cs typeface="Arial"/>
-                      </a:endParaRPr>
-                    </a:p>
-                  </a:txBody>
-                  <a:tcPr anchor="ctr"/>
-                </a:tc>
               </a:tr>
               <a:tr h="201930">
                 <a:tc>
@@ -10645,32 +10566,6 @@
                     </a:solidFill>
                   </a:tcPr>
                 </a:tc>
-                <a:tc>
-                  <a:txBody>
-                    <a:bodyPr/>
-                    <a:p>
-                      <a:pPr>
-                        <a:defRPr/>
-                      </a:pPr>
-                      <a:r>
-                        <a:rPr sz="1200" b="0" i="0" u="none">
-                          <a:solidFill>
-                            <a:srgbClr val="000000"/>
-                          </a:solidFill>
-                          <a:latin typeface="Arial"/>
-                          <a:ea typeface="Arial"/>
-                          <a:cs typeface="Arial"/>
-                        </a:rPr>
-                        <a:t>Motivation +++ ; Ressources +++ ; Activité +++ ; Pertinence élevée</a:t>
-                      </a:r>
-                      <a:endParaRPr>
-                        <a:latin typeface="Arial"/>
-                        <a:cs typeface="Arial"/>
-                      </a:endParaRPr>
-                    </a:p>
-                  </a:txBody>
-                  <a:tcPr anchor="ctr"/>
-                </a:tc>
               </a:tr>
               <a:tr h="384810">
                 <a:tc>
@@ -10830,32 +10725,6 @@
                     </a:solidFill>
                   </a:tcPr>
                 </a:tc>
-                <a:tc>
-                  <a:txBody>
-                    <a:bodyPr/>
-                    <a:p>
-                      <a:pPr>
-                        <a:defRPr/>
-                      </a:pPr>
-                      <a:r>
-                        <a:rPr sz="1200" b="0" i="0" u="none">
-                          <a:solidFill>
-                            <a:srgbClr val="000000"/>
-                          </a:solidFill>
-                          <a:latin typeface="Arial"/>
-                          <a:ea typeface="Arial"/>
-                          <a:cs typeface="Arial"/>
-                        </a:rPr>
-                        <a:t>Même profil que SM3, mais cible les comptes plutôt que la CB</a:t>
-                      </a:r>
-                      <a:endParaRPr>
-                        <a:latin typeface="Arial"/>
-                        <a:cs typeface="Arial"/>
-                      </a:endParaRPr>
-                    </a:p>
-                  </a:txBody>
-                  <a:tcPr anchor="ctr"/>
-                </a:tc>
               </a:tr>
               <a:tr h="384810">
                 <a:tc>
@@ -11015,32 +10884,6 @@
                     </a:solidFill>
                   </a:tcPr>
                 </a:tc>
-                <a:tc>
-                  <a:txBody>
-                    <a:bodyPr/>
-                    <a:p>
-                      <a:pPr>
-                        <a:defRPr/>
-                      </a:pPr>
-                      <a:r>
-                        <a:rPr sz="1200" b="0" i="0" u="none">
-                          <a:solidFill>
-                            <a:srgbClr val="000000"/>
-                          </a:solidFill>
-                          <a:latin typeface="Arial"/>
-                          <a:ea typeface="Arial"/>
-                          <a:cs typeface="Arial"/>
-                        </a:rPr>
-                        <a:t>Motivation + ; Activité + ; Ressources +++ mais risque juridique → probabilité faible</a:t>
-                      </a:r>
-                      <a:endParaRPr>
-                        <a:latin typeface="Arial"/>
-                        <a:cs typeface="Arial"/>
-                      </a:endParaRPr>
-                    </a:p>
-                  </a:txBody>
-                  <a:tcPr anchor="ctr"/>
-                </a:tc>
               </a:tr>
               <a:tr h="384810">
                 <a:tc>
@@ -11199,32 +11042,6 @@
                       <a:srgbClr val="00B050"/>
                     </a:solidFill>
                   </a:tcPr>
-                </a:tc>
-                <a:tc>
-                  <a:txBody>
-                    <a:bodyPr/>
-                    <a:p>
-                      <a:pPr>
-                        <a:defRPr/>
-                      </a:pPr>
-                      <a:r>
-                        <a:rPr sz="1200" b="0" i="0" u="none">
-                          <a:solidFill>
-                            <a:srgbClr val="000000"/>
-                          </a:solidFill>
-                          <a:latin typeface="Arial"/>
-                          <a:ea typeface="Arial"/>
-                          <a:cs typeface="Arial"/>
-                        </a:rPr>
-                        <a:t>Pertinence faible selon ton tableau ; scénario très spéculatif</a:t>
-                      </a:r>
-                      <a:endParaRPr>
-                        <a:latin typeface="Arial"/>
-                        <a:cs typeface="Arial"/>
-                      </a:endParaRPr>
-                    </a:p>
-                  </a:txBody>
-                  <a:tcPr anchor="ctr"/>
                 </a:tc>
               </a:tr>
             </a:tbl>
@@ -11266,7 +11083,7 @@
       </p:grpSpPr>
       <p:sp>
         <p:nvSpPr>
-          <p:cNvPr id="1638261199" name="Titre 1"/>
+          <p:cNvPr id="1501210563" name="Titre 1"/>
           <p:cNvSpPr>
             <a:spLocks noGrp="1"/>
           </p:cNvSpPr>
@@ -11297,7 +11114,7 @@
       </p:sp>
       <p:sp>
         <p:nvSpPr>
-          <p:cNvPr id="1769376407" name="Espace réservé du contenu 3"/>
+          <p:cNvPr id="1711563603" name="Espace réservé du contenu 3"/>
           <p:cNvSpPr>
             <a:spLocks noGrp="1"/>
           </p:cNvSpPr>
@@ -11687,7 +11504,7 @@
       </p:sp>
       <p:graphicFrame>
         <p:nvGraphicFramePr>
-          <p:cNvPr id="1068566569" name=""/>
+          <p:cNvPr id="1641447886" name=""/>
           <p:cNvGraphicFramePr>
             <a:graphicFrameLocks xmlns:a="http://schemas.openxmlformats.org/drawingml/2006/main"/>
           </p:cNvGraphicFramePr>
@@ -12061,7 +11878,7 @@
       </p:graphicFrame>
       <p:sp>
         <p:nvSpPr>
-          <p:cNvPr id="1542760954" name=""/>
+          <p:cNvPr id="182836205" name=""/>
           <p:cNvSpPr txBox="1"/>
           <p:nvPr/>
         </p:nvSpPr>
@@ -12093,7 +11910,7 @@
       </p:sp>
       <p:sp>
         <p:nvSpPr>
-          <p:cNvPr id="1346496852" name=""/>
+          <p:cNvPr id="357364000" name=""/>
           <p:cNvSpPr txBox="1"/>
           <p:nvPr/>
         </p:nvSpPr>
@@ -12158,7 +11975,7 @@
       </p:grpSpPr>
       <p:sp>
         <p:nvSpPr>
-          <p:cNvPr id="1570705739" name="Titre 1"/>
+          <p:cNvPr id="1776480770" name="Titre 1"/>
           <p:cNvSpPr>
             <a:spLocks noGrp="1"/>
           </p:cNvSpPr>
@@ -12189,7 +12006,7 @@
       </p:sp>
       <p:graphicFrame>
         <p:nvGraphicFramePr>
-          <p:cNvPr id="662088260" name=""/>
+          <p:cNvPr id="1216907860" name=""/>
           <p:cNvGraphicFramePr>
             <a:graphicFrameLocks xmlns:a="http://schemas.openxmlformats.org/drawingml/2006/main"/>
           </p:cNvGraphicFramePr>

</xml_diff>